<commit_message>
Update overview diagram to indicate that Vahti.BluetoothGw is now Vahti.Collector
</commit_message>
<xml_diff>
--- a/doc/diagrams/Diagrams.pptx
+++ b/doc/diagrams/Diagrams.pptx
@@ -261,7 +261,7 @@
           <a:p>
             <a:fld id="{AEF409E5-B26F-42D2-9A35-318309B239A9}" type="datetimeFigureOut">
               <a:rPr lang="fi-FI" smtClean="0"/>
-              <a:t>11.4.2020</a:t>
+              <a:t>18.4.2020</a:t>
             </a:fld>
             <a:endParaRPr lang="fi-FI"/>
           </a:p>
@@ -461,7 +461,7 @@
           <a:p>
             <a:fld id="{AEF409E5-B26F-42D2-9A35-318309B239A9}" type="datetimeFigureOut">
               <a:rPr lang="fi-FI" smtClean="0"/>
-              <a:t>11.4.2020</a:t>
+              <a:t>18.4.2020</a:t>
             </a:fld>
             <a:endParaRPr lang="fi-FI"/>
           </a:p>
@@ -671,7 +671,7 @@
           <a:p>
             <a:fld id="{AEF409E5-B26F-42D2-9A35-318309B239A9}" type="datetimeFigureOut">
               <a:rPr lang="fi-FI" smtClean="0"/>
-              <a:t>11.4.2020</a:t>
+              <a:t>18.4.2020</a:t>
             </a:fld>
             <a:endParaRPr lang="fi-FI"/>
           </a:p>
@@ -871,7 +871,7 @@
           <a:p>
             <a:fld id="{AEF409E5-B26F-42D2-9A35-318309B239A9}" type="datetimeFigureOut">
               <a:rPr lang="fi-FI" smtClean="0"/>
-              <a:t>11.4.2020</a:t>
+              <a:t>18.4.2020</a:t>
             </a:fld>
             <a:endParaRPr lang="fi-FI"/>
           </a:p>
@@ -1147,7 +1147,7 @@
           <a:p>
             <a:fld id="{AEF409E5-B26F-42D2-9A35-318309B239A9}" type="datetimeFigureOut">
               <a:rPr lang="fi-FI" smtClean="0"/>
-              <a:t>11.4.2020</a:t>
+              <a:t>18.4.2020</a:t>
             </a:fld>
             <a:endParaRPr lang="fi-FI"/>
           </a:p>
@@ -1415,7 +1415,7 @@
           <a:p>
             <a:fld id="{AEF409E5-B26F-42D2-9A35-318309B239A9}" type="datetimeFigureOut">
               <a:rPr lang="fi-FI" smtClean="0"/>
-              <a:t>11.4.2020</a:t>
+              <a:t>18.4.2020</a:t>
             </a:fld>
             <a:endParaRPr lang="fi-FI"/>
           </a:p>
@@ -1830,7 +1830,7 @@
           <a:p>
             <a:fld id="{AEF409E5-B26F-42D2-9A35-318309B239A9}" type="datetimeFigureOut">
               <a:rPr lang="fi-FI" smtClean="0"/>
-              <a:t>11.4.2020</a:t>
+              <a:t>18.4.2020</a:t>
             </a:fld>
             <a:endParaRPr lang="fi-FI"/>
           </a:p>
@@ -1972,7 +1972,7 @@
           <a:p>
             <a:fld id="{AEF409E5-B26F-42D2-9A35-318309B239A9}" type="datetimeFigureOut">
               <a:rPr lang="fi-FI" smtClean="0"/>
-              <a:t>11.4.2020</a:t>
+              <a:t>18.4.2020</a:t>
             </a:fld>
             <a:endParaRPr lang="fi-FI"/>
           </a:p>
@@ -2085,7 +2085,7 @@
           <a:p>
             <a:fld id="{AEF409E5-B26F-42D2-9A35-318309B239A9}" type="datetimeFigureOut">
               <a:rPr lang="fi-FI" smtClean="0"/>
-              <a:t>11.4.2020</a:t>
+              <a:t>18.4.2020</a:t>
             </a:fld>
             <a:endParaRPr lang="fi-FI"/>
           </a:p>
@@ -2398,7 +2398,7 @@
           <a:p>
             <a:fld id="{AEF409E5-B26F-42D2-9A35-318309B239A9}" type="datetimeFigureOut">
               <a:rPr lang="fi-FI" smtClean="0"/>
-              <a:t>11.4.2020</a:t>
+              <a:t>18.4.2020</a:t>
             </a:fld>
             <a:endParaRPr lang="fi-FI"/>
           </a:p>
@@ -2687,7 +2687,7 @@
           <a:p>
             <a:fld id="{AEF409E5-B26F-42D2-9A35-318309B239A9}" type="datetimeFigureOut">
               <a:rPr lang="fi-FI" smtClean="0"/>
-              <a:t>11.4.2020</a:t>
+              <a:t>18.4.2020</a:t>
             </a:fld>
             <a:endParaRPr lang="fi-FI"/>
           </a:p>
@@ -2930,7 +2930,7 @@
           <a:p>
             <a:fld id="{AEF409E5-B26F-42D2-9A35-318309B239A9}" type="datetimeFigureOut">
               <a:rPr lang="fi-FI" smtClean="0"/>
-              <a:t>11.4.2020</a:t>
+              <a:t>18.4.2020</a:t>
             </a:fld>
             <a:endParaRPr lang="fi-FI"/>
           </a:p>
@@ -3494,7 +3494,7 @@
         </p:nvSpPr>
         <p:spPr>
           <a:xfrm>
-            <a:off x="1648536" y="552395"/>
+            <a:off x="1870058" y="362676"/>
             <a:ext cx="1139680" cy="1057086"/>
           </a:xfrm>
           <a:prstGeom prst="ellipse">
@@ -3638,9 +3638,10 @@
           <a:p>
             <a:pPr algn="ctr"/>
             <a:r>
-              <a:rPr lang="fi-FI" sz="1400" dirty="0"/>
-              <a:t>Vahti.BluetoothGw</a:t>
-            </a:r>
+              <a:rPr lang="fi-FI" sz="1400" dirty="0" err="1"/>
+              <a:t>Vahti.Collector</a:t>
+            </a:r>
+            <a:endParaRPr lang="fi-FI" sz="1400" dirty="0"/>
           </a:p>
         </p:txBody>
       </p:sp>
@@ -3798,7 +3799,7 @@
         </p:nvSpPr>
         <p:spPr>
           <a:xfrm>
-            <a:off x="2880150" y="1129668"/>
+            <a:off x="3051253" y="1019948"/>
             <a:ext cx="1143719" cy="381917"/>
           </a:xfrm>
           <a:prstGeom prst="lightningBolt">
@@ -3917,7 +3918,7 @@
         </p:nvSpPr>
         <p:spPr>
           <a:xfrm>
-            <a:off x="1389640" y="2460354"/>
+            <a:off x="1498657" y="2838842"/>
             <a:ext cx="1661613" cy="876693"/>
           </a:xfrm>
           <a:prstGeom prst="flowChartAlternateProcess">
@@ -3980,8 +3981,8 @@
         </p:nvCxnSpPr>
         <p:spPr>
           <a:xfrm flipV="1">
-            <a:off x="3051253" y="2881371"/>
-            <a:ext cx="1068927" cy="17330"/>
+            <a:off x="3160270" y="2881371"/>
+            <a:ext cx="959910" cy="395818"/>
           </a:xfrm>
           <a:prstGeom prst="straightConnector1">
             <a:avLst/>
@@ -4019,7 +4020,7 @@
         </p:nvSpPr>
         <p:spPr>
           <a:xfrm>
-            <a:off x="1441008" y="4072145"/>
+            <a:off x="1543119" y="4123401"/>
             <a:ext cx="1554735" cy="639045"/>
           </a:xfrm>
           <a:prstGeom prst="ellipse">
@@ -4085,8 +4086,8 @@
         </p:nvCxnSpPr>
         <p:spPr>
           <a:xfrm flipV="1">
-            <a:off x="2218376" y="3337047"/>
-            <a:ext cx="2071" cy="735098"/>
+            <a:off x="2320487" y="3715535"/>
+            <a:ext cx="8977" cy="407866"/>
           </a:xfrm>
           <a:prstGeom prst="straightConnector1">
             <a:avLst/>
@@ -4159,7 +4160,7 @@
         </p:nvSpPr>
         <p:spPr>
           <a:xfrm>
-            <a:off x="2822563" y="852669"/>
+            <a:off x="3088677" y="742949"/>
             <a:ext cx="979051" cy="276999"/>
           </a:xfrm>
           <a:prstGeom prst="rect">
@@ -5278,6 +5279,112 @@
           </a:p>
         </p:txBody>
       </p:sp>
+      <p:sp>
+        <p:nvSpPr>
+          <p:cNvPr id="40" name="Oval 39">
+            <a:extLst>
+              <a:ext uri="{FF2B5EF4-FFF2-40B4-BE49-F238E27FC236}">
+                <a16:creationId xmlns:a16="http://schemas.microsoft.com/office/drawing/2014/main" id="{0299192A-3C9B-4910-994D-427EB3086970}"/>
+              </a:ext>
+            </a:extLst>
+          </p:cNvPr>
+          <p:cNvSpPr/>
+          <p:nvPr/>
+        </p:nvSpPr>
+        <p:spPr>
+          <a:xfrm>
+            <a:off x="1796424" y="1645346"/>
+            <a:ext cx="1554735" cy="639045"/>
+          </a:xfrm>
+          <a:prstGeom prst="ellipse">
+            <a:avLst/>
+          </a:prstGeom>
+          <a:solidFill>
+            <a:schemeClr val="bg1">
+              <a:lumMod val="95000"/>
+            </a:schemeClr>
+          </a:solidFill>
+        </p:spPr>
+        <p:style>
+          <a:lnRef idx="2">
+            <a:schemeClr val="accent1">
+              <a:shade val="50000"/>
+            </a:schemeClr>
+          </a:lnRef>
+          <a:fillRef idx="1">
+            <a:schemeClr val="accent1"/>
+          </a:fillRef>
+          <a:effectRef idx="0">
+            <a:schemeClr val="accent1"/>
+          </a:effectRef>
+          <a:fontRef idx="minor">
+            <a:schemeClr val="lt1"/>
+          </a:fontRef>
+        </p:style>
+        <p:txBody>
+          <a:bodyPr rtlCol="0" anchor="ctr"/>
+          <a:lstStyle/>
+          <a:p>
+            <a:pPr algn="ctr"/>
+            <a:r>
+              <a:rPr lang="fi-FI" sz="1400" dirty="0">
+                <a:solidFill>
+                  <a:schemeClr val="tx1"/>
+                </a:solidFill>
+              </a:rPr>
+              <a:t>Other sensor</a:t>
+            </a:r>
+            <a:endParaRPr lang="en-US" sz="1400" dirty="0">
+              <a:solidFill>
+                <a:schemeClr val="tx1"/>
+              </a:solidFill>
+            </a:endParaRPr>
+          </a:p>
+        </p:txBody>
+      </p:sp>
+      <p:cxnSp>
+        <p:nvCxnSpPr>
+          <p:cNvPr id="31" name="Straight Arrow Connector 30">
+            <a:extLst>
+              <a:ext uri="{FF2B5EF4-FFF2-40B4-BE49-F238E27FC236}">
+                <a16:creationId xmlns:a16="http://schemas.microsoft.com/office/drawing/2014/main" id="{47792EDC-DEC2-41DF-9A1F-9C24ABA4D479}"/>
+              </a:ext>
+            </a:extLst>
+          </p:cNvPr>
+          <p:cNvCxnSpPr>
+            <a:cxnSpLocks/>
+            <a:stCxn id="40" idx="6"/>
+            <a:endCxn id="6" idx="1"/>
+          </p:cNvCxnSpPr>
+          <p:nvPr/>
+        </p:nvCxnSpPr>
+        <p:spPr>
+          <a:xfrm flipV="1">
+            <a:off x="3351159" y="1524789"/>
+            <a:ext cx="777368" cy="440080"/>
+          </a:xfrm>
+          <a:prstGeom prst="straightConnector1">
+            <a:avLst/>
+          </a:prstGeom>
+          <a:ln>
+            <a:tailEnd type="triangle"/>
+          </a:ln>
+        </p:spPr>
+        <p:style>
+          <a:lnRef idx="1">
+            <a:schemeClr val="accent1"/>
+          </a:lnRef>
+          <a:fillRef idx="0">
+            <a:schemeClr val="accent1"/>
+          </a:fillRef>
+          <a:effectRef idx="0">
+            <a:schemeClr val="accent1"/>
+          </a:effectRef>
+          <a:fontRef idx="minor">
+            <a:schemeClr val="tx1"/>
+          </a:fontRef>
+        </p:style>
+      </p:cxnSp>
     </p:spTree>
     <p:extLst>
       <p:ext uri="{BB962C8B-B14F-4D97-AF65-F5344CB8AC3E}">

</xml_diff>

<commit_message>
Add web app related content to documentation
</commit_message>
<xml_diff>
--- a/doc/diagrams/Diagrams.pptx
+++ b/doc/diagrams/Diagrams.pptx
@@ -261,7 +261,7 @@
           <a:p>
             <a:fld id="{AEF409E5-B26F-42D2-9A35-318309B239A9}" type="datetimeFigureOut">
               <a:rPr lang="fi-FI" smtClean="0"/>
-              <a:t>18.4.2020</a:t>
+              <a:t>17.1.2021</a:t>
             </a:fld>
             <a:endParaRPr lang="fi-FI"/>
           </a:p>
@@ -461,7 +461,7 @@
           <a:p>
             <a:fld id="{AEF409E5-B26F-42D2-9A35-318309B239A9}" type="datetimeFigureOut">
               <a:rPr lang="fi-FI" smtClean="0"/>
-              <a:t>18.4.2020</a:t>
+              <a:t>17.1.2021</a:t>
             </a:fld>
             <a:endParaRPr lang="fi-FI"/>
           </a:p>
@@ -671,7 +671,7 @@
           <a:p>
             <a:fld id="{AEF409E5-B26F-42D2-9A35-318309B239A9}" type="datetimeFigureOut">
               <a:rPr lang="fi-FI" smtClean="0"/>
-              <a:t>18.4.2020</a:t>
+              <a:t>17.1.2021</a:t>
             </a:fld>
             <a:endParaRPr lang="fi-FI"/>
           </a:p>
@@ -871,7 +871,7 @@
           <a:p>
             <a:fld id="{AEF409E5-B26F-42D2-9A35-318309B239A9}" type="datetimeFigureOut">
               <a:rPr lang="fi-FI" smtClean="0"/>
-              <a:t>18.4.2020</a:t>
+              <a:t>17.1.2021</a:t>
             </a:fld>
             <a:endParaRPr lang="fi-FI"/>
           </a:p>
@@ -1147,7 +1147,7 @@
           <a:p>
             <a:fld id="{AEF409E5-B26F-42D2-9A35-318309B239A9}" type="datetimeFigureOut">
               <a:rPr lang="fi-FI" smtClean="0"/>
-              <a:t>18.4.2020</a:t>
+              <a:t>17.1.2021</a:t>
             </a:fld>
             <a:endParaRPr lang="fi-FI"/>
           </a:p>
@@ -1415,7 +1415,7 @@
           <a:p>
             <a:fld id="{AEF409E5-B26F-42D2-9A35-318309B239A9}" type="datetimeFigureOut">
               <a:rPr lang="fi-FI" smtClean="0"/>
-              <a:t>18.4.2020</a:t>
+              <a:t>17.1.2021</a:t>
             </a:fld>
             <a:endParaRPr lang="fi-FI"/>
           </a:p>
@@ -1830,7 +1830,7 @@
           <a:p>
             <a:fld id="{AEF409E5-B26F-42D2-9A35-318309B239A9}" type="datetimeFigureOut">
               <a:rPr lang="fi-FI" smtClean="0"/>
-              <a:t>18.4.2020</a:t>
+              <a:t>17.1.2021</a:t>
             </a:fld>
             <a:endParaRPr lang="fi-FI"/>
           </a:p>
@@ -1972,7 +1972,7 @@
           <a:p>
             <a:fld id="{AEF409E5-B26F-42D2-9A35-318309B239A9}" type="datetimeFigureOut">
               <a:rPr lang="fi-FI" smtClean="0"/>
-              <a:t>18.4.2020</a:t>
+              <a:t>17.1.2021</a:t>
             </a:fld>
             <a:endParaRPr lang="fi-FI"/>
           </a:p>
@@ -2085,7 +2085,7 @@
           <a:p>
             <a:fld id="{AEF409E5-B26F-42D2-9A35-318309B239A9}" type="datetimeFigureOut">
               <a:rPr lang="fi-FI" smtClean="0"/>
-              <a:t>18.4.2020</a:t>
+              <a:t>17.1.2021</a:t>
             </a:fld>
             <a:endParaRPr lang="fi-FI"/>
           </a:p>
@@ -2398,7 +2398,7 @@
           <a:p>
             <a:fld id="{AEF409E5-B26F-42D2-9A35-318309B239A9}" type="datetimeFigureOut">
               <a:rPr lang="fi-FI" smtClean="0"/>
-              <a:t>18.4.2020</a:t>
+              <a:t>17.1.2021</a:t>
             </a:fld>
             <a:endParaRPr lang="fi-FI"/>
           </a:p>
@@ -2687,7 +2687,7 @@
           <a:p>
             <a:fld id="{AEF409E5-B26F-42D2-9A35-318309B239A9}" type="datetimeFigureOut">
               <a:rPr lang="fi-FI" smtClean="0"/>
-              <a:t>18.4.2020</a:t>
+              <a:t>17.1.2021</a:t>
             </a:fld>
             <a:endParaRPr lang="fi-FI"/>
           </a:p>
@@ -2930,7 +2930,7 @@
           <a:p>
             <a:fld id="{AEF409E5-B26F-42D2-9A35-318309B239A9}" type="datetimeFigureOut">
               <a:rPr lang="fi-FI" smtClean="0"/>
-              <a:t>18.4.2020</a:t>
+              <a:t>17.1.2021</a:t>
             </a:fld>
             <a:endParaRPr lang="fi-FI"/>
           </a:p>
@@ -4195,7 +4195,7 @@
         </p:nvSpPr>
         <p:spPr>
           <a:xfrm>
-            <a:off x="10048242" y="2331813"/>
+            <a:off x="10048242" y="450329"/>
             <a:ext cx="1220709" cy="1927939"/>
           </a:xfrm>
           <a:prstGeom prst="roundRect">
@@ -4244,7 +4244,7 @@
         </p:nvSpPr>
         <p:spPr>
           <a:xfrm>
-            <a:off x="10145628" y="2386185"/>
+            <a:off x="10145628" y="504701"/>
             <a:ext cx="1035905" cy="1802699"/>
           </a:xfrm>
           <a:prstGeom prst="rect">
@@ -4293,7 +4293,7 @@
         </p:nvSpPr>
         <p:spPr>
           <a:xfrm>
-            <a:off x="10145628" y="2386185"/>
+            <a:off x="10145628" y="504701"/>
             <a:ext cx="1035905" cy="102669"/>
           </a:xfrm>
           <a:prstGeom prst="rect">
@@ -4344,7 +4344,7 @@
         </p:nvSpPr>
         <p:spPr>
           <a:xfrm>
-            <a:off x="10246304" y="2470893"/>
+            <a:off x="10296581" y="597177"/>
             <a:ext cx="740908" cy="215444"/>
           </a:xfrm>
           <a:prstGeom prst="rect">
@@ -4359,7 +4359,7 @@
           <a:lstStyle/>
           <a:p>
             <a:r>
-              <a:rPr lang="en-US" sz="800" b="1" dirty="0" err="1"/>
+              <a:rPr lang="en-US" sz="800" b="1" dirty="0"/>
               <a:t>Vahti.Mobile</a:t>
             </a:r>
             <a:endParaRPr lang="en-FI" sz="800" b="1" dirty="0"/>
@@ -4382,7 +4382,7 @@
         </p:nvCxnSpPr>
         <p:spPr>
           <a:xfrm>
-            <a:off x="10186951" y="2541263"/>
+            <a:off x="10186951" y="659779"/>
             <a:ext cx="100117" cy="0"/>
           </a:xfrm>
           <a:prstGeom prst="line">
@@ -4420,7 +4420,7 @@
         </p:nvCxnSpPr>
         <p:spPr>
           <a:xfrm>
-            <a:off x="10186951" y="2578615"/>
+            <a:off x="10186951" y="697131"/>
             <a:ext cx="100117" cy="0"/>
           </a:xfrm>
           <a:prstGeom prst="line">
@@ -4458,7 +4458,7 @@
         </p:nvCxnSpPr>
         <p:spPr>
           <a:xfrm>
-            <a:off x="10185847" y="2617552"/>
+            <a:off x="10185847" y="736068"/>
             <a:ext cx="100117" cy="0"/>
           </a:xfrm>
           <a:prstGeom prst="line">
@@ -4593,8 +4593,8 @@
         </p:nvCxnSpPr>
         <p:spPr>
           <a:xfrm flipH="1">
-            <a:off x="8301398" y="3295783"/>
-            <a:ext cx="1746844" cy="543454"/>
+            <a:off x="8301398" y="1414299"/>
+            <a:ext cx="1746844" cy="2424938"/>
           </a:xfrm>
           <a:prstGeom prst="straightConnector1">
             <a:avLst/>
@@ -4730,9 +4730,9 @@
           <p:nvPr/>
         </p:nvCxnSpPr>
         <p:spPr>
-          <a:xfrm>
-            <a:off x="8582183" y="1937778"/>
-            <a:ext cx="1563445" cy="1349757"/>
+          <a:xfrm flipV="1">
+            <a:off x="8582183" y="1406051"/>
+            <a:ext cx="1563445" cy="531727"/>
           </a:xfrm>
           <a:prstGeom prst="straightConnector1">
             <a:avLst/>
@@ -4866,9 +4866,9 @@
           <p:nvPr/>
         </p:nvCxnSpPr>
         <p:spPr>
-          <a:xfrm>
-            <a:off x="8582183" y="2739815"/>
-            <a:ext cx="1466059" cy="555968"/>
+          <a:xfrm flipV="1">
+            <a:off x="8582183" y="1414299"/>
+            <a:ext cx="1466059" cy="1325516"/>
           </a:xfrm>
           <a:prstGeom prst="straightConnector1">
             <a:avLst/>
@@ -4906,7 +4906,7 @@
         </p:nvSpPr>
         <p:spPr>
           <a:xfrm>
-            <a:off x="10260460" y="2831136"/>
+            <a:off x="10260460" y="949652"/>
             <a:ext cx="806240" cy="487674"/>
           </a:xfrm>
           <a:prstGeom prst="rect">
@@ -4955,7 +4955,7 @@
         </p:nvSpPr>
         <p:spPr>
           <a:xfrm>
-            <a:off x="10251223" y="3005206"/>
+            <a:off x="10251223" y="1123722"/>
             <a:ext cx="814283" cy="314424"/>
           </a:xfrm>
           <a:custGeom>
@@ -5221,7 +5221,7 @@
         </p:nvSpPr>
         <p:spPr>
           <a:xfrm>
-            <a:off x="10334958" y="2669565"/>
+            <a:off x="10334958" y="788081"/>
             <a:ext cx="635110" cy="169277"/>
           </a:xfrm>
           <a:prstGeom prst="rect">
@@ -5362,6 +5362,644 @@
           <a:xfrm flipV="1">
             <a:off x="3351159" y="1524789"/>
             <a:ext cx="777368" cy="440080"/>
+          </a:xfrm>
+          <a:prstGeom prst="straightConnector1">
+            <a:avLst/>
+          </a:prstGeom>
+          <a:ln>
+            <a:tailEnd type="triangle"/>
+          </a:ln>
+        </p:spPr>
+        <p:style>
+          <a:lnRef idx="1">
+            <a:schemeClr val="accent1"/>
+          </a:lnRef>
+          <a:fillRef idx="0">
+            <a:schemeClr val="accent1"/>
+          </a:fillRef>
+          <a:effectRef idx="0">
+            <a:schemeClr val="accent1"/>
+          </a:effectRef>
+          <a:fontRef idx="minor">
+            <a:schemeClr val="tx1"/>
+          </a:fontRef>
+        </p:style>
+      </p:cxnSp>
+      <p:sp>
+        <p:nvSpPr>
+          <p:cNvPr id="44" name="Rectangle: Rounded Corners 43">
+            <a:extLst>
+              <a:ext uri="{FF2B5EF4-FFF2-40B4-BE49-F238E27FC236}">
+                <a16:creationId xmlns:a16="http://schemas.microsoft.com/office/drawing/2014/main" id="{EACCC8F2-04F8-4C91-8C36-D81B9690819A}"/>
+              </a:ext>
+            </a:extLst>
+          </p:cNvPr>
+          <p:cNvSpPr/>
+          <p:nvPr/>
+        </p:nvSpPr>
+        <p:spPr>
+          <a:xfrm>
+            <a:off x="10048242" y="2694231"/>
+            <a:ext cx="1220709" cy="1927939"/>
+          </a:xfrm>
+          <a:prstGeom prst="roundRect">
+            <a:avLst/>
+          </a:prstGeom>
+          <a:solidFill>
+            <a:schemeClr val="tx1"/>
+          </a:solidFill>
+        </p:spPr>
+        <p:style>
+          <a:lnRef idx="2">
+            <a:schemeClr val="accent1">
+              <a:shade val="50000"/>
+            </a:schemeClr>
+          </a:lnRef>
+          <a:fillRef idx="1">
+            <a:schemeClr val="accent1"/>
+          </a:fillRef>
+          <a:effectRef idx="0">
+            <a:schemeClr val="accent1"/>
+          </a:effectRef>
+          <a:fontRef idx="minor">
+            <a:schemeClr val="lt1"/>
+          </a:fontRef>
+        </p:style>
+        <p:txBody>
+          <a:bodyPr rtlCol="0" anchor="ctr"/>
+          <a:lstStyle/>
+          <a:p>
+            <a:pPr algn="ctr"/>
+            <a:endParaRPr lang="en-US"/>
+          </a:p>
+        </p:txBody>
+      </p:sp>
+      <p:sp>
+        <p:nvSpPr>
+          <p:cNvPr id="45" name="Rectangle 44">
+            <a:extLst>
+              <a:ext uri="{FF2B5EF4-FFF2-40B4-BE49-F238E27FC236}">
+                <a16:creationId xmlns:a16="http://schemas.microsoft.com/office/drawing/2014/main" id="{872600C5-C563-4B55-932C-166D70E05E26}"/>
+              </a:ext>
+            </a:extLst>
+          </p:cNvPr>
+          <p:cNvSpPr/>
+          <p:nvPr/>
+        </p:nvSpPr>
+        <p:spPr>
+          <a:xfrm>
+            <a:off x="10145628" y="2748603"/>
+            <a:ext cx="1035905" cy="1802699"/>
+          </a:xfrm>
+          <a:prstGeom prst="rect">
+            <a:avLst/>
+          </a:prstGeom>
+          <a:solidFill>
+            <a:srgbClr val="1A1A1A"/>
+          </a:solidFill>
+        </p:spPr>
+        <p:style>
+          <a:lnRef idx="2">
+            <a:schemeClr val="accent1">
+              <a:shade val="50000"/>
+            </a:schemeClr>
+          </a:lnRef>
+          <a:fillRef idx="1">
+            <a:schemeClr val="accent1"/>
+          </a:fillRef>
+          <a:effectRef idx="0">
+            <a:schemeClr val="accent1"/>
+          </a:effectRef>
+          <a:fontRef idx="minor">
+            <a:schemeClr val="lt1"/>
+          </a:fontRef>
+        </p:style>
+        <p:txBody>
+          <a:bodyPr rtlCol="0" anchor="ctr"/>
+          <a:lstStyle/>
+          <a:p>
+            <a:pPr algn="ctr"/>
+            <a:endParaRPr lang="en-US" dirty="0"/>
+          </a:p>
+        </p:txBody>
+      </p:sp>
+      <p:sp>
+        <p:nvSpPr>
+          <p:cNvPr id="46" name="Rectangle 45">
+            <a:extLst>
+              <a:ext uri="{FF2B5EF4-FFF2-40B4-BE49-F238E27FC236}">
+                <a16:creationId xmlns:a16="http://schemas.microsoft.com/office/drawing/2014/main" id="{DC8B0597-6EFD-4853-8DA7-1EC1BF9FBFEE}"/>
+              </a:ext>
+            </a:extLst>
+          </p:cNvPr>
+          <p:cNvSpPr/>
+          <p:nvPr/>
+        </p:nvSpPr>
+        <p:spPr>
+          <a:xfrm>
+            <a:off x="10145628" y="2748603"/>
+            <a:ext cx="1035905" cy="102669"/>
+          </a:xfrm>
+          <a:prstGeom prst="rect">
+            <a:avLst/>
+          </a:prstGeom>
+          <a:solidFill>
+            <a:schemeClr val="accent1">
+              <a:lumMod val="75000"/>
+            </a:schemeClr>
+          </a:solidFill>
+        </p:spPr>
+        <p:style>
+          <a:lnRef idx="2">
+            <a:schemeClr val="accent1">
+              <a:shade val="50000"/>
+            </a:schemeClr>
+          </a:lnRef>
+          <a:fillRef idx="1">
+            <a:schemeClr val="accent1"/>
+          </a:fillRef>
+          <a:effectRef idx="0">
+            <a:schemeClr val="accent1"/>
+          </a:effectRef>
+          <a:fontRef idx="minor">
+            <a:schemeClr val="lt1"/>
+          </a:fontRef>
+        </p:style>
+        <p:txBody>
+          <a:bodyPr rtlCol="0" anchor="ctr"/>
+          <a:lstStyle/>
+          <a:p>
+            <a:pPr algn="ctr"/>
+            <a:endParaRPr lang="en-FI"/>
+          </a:p>
+        </p:txBody>
+      </p:sp>
+      <p:sp>
+        <p:nvSpPr>
+          <p:cNvPr id="47" name="TextBox 46">
+            <a:extLst>
+              <a:ext uri="{FF2B5EF4-FFF2-40B4-BE49-F238E27FC236}">
+                <a16:creationId xmlns:a16="http://schemas.microsoft.com/office/drawing/2014/main" id="{2AA9FAD1-BC2D-4D4F-B5B0-6C84CA9C0745}"/>
+              </a:ext>
+            </a:extLst>
+          </p:cNvPr>
+          <p:cNvSpPr txBox="1"/>
+          <p:nvPr/>
+        </p:nvSpPr>
+        <p:spPr>
+          <a:xfrm>
+            <a:off x="10332956" y="2840964"/>
+            <a:ext cx="638316" cy="215444"/>
+          </a:xfrm>
+          <a:prstGeom prst="rect">
+            <a:avLst/>
+          </a:prstGeom>
+          <a:noFill/>
+        </p:spPr>
+        <p:txBody>
+          <a:bodyPr wrap="none" rtlCol="0">
+            <a:spAutoFit/>
+          </a:bodyPr>
+          <a:lstStyle/>
+          <a:p>
+            <a:r>
+              <a:rPr lang="en-US" sz="800" b="1" dirty="0" err="1">
+                <a:solidFill>
+                  <a:schemeClr val="bg1"/>
+                </a:solidFill>
+              </a:rPr>
+              <a:t>Vahti.Web</a:t>
+            </a:r>
+            <a:endParaRPr lang="en-FI" sz="800" b="1" dirty="0">
+              <a:solidFill>
+                <a:schemeClr val="bg1"/>
+              </a:solidFill>
+            </a:endParaRPr>
+          </a:p>
+        </p:txBody>
+      </p:sp>
+      <p:sp>
+        <p:nvSpPr>
+          <p:cNvPr id="51" name="Rectangle 50">
+            <a:extLst>
+              <a:ext uri="{FF2B5EF4-FFF2-40B4-BE49-F238E27FC236}">
+                <a16:creationId xmlns:a16="http://schemas.microsoft.com/office/drawing/2014/main" id="{26AC0047-0FC0-41DE-9F16-EED053F6EAD0}"/>
+              </a:ext>
+            </a:extLst>
+          </p:cNvPr>
+          <p:cNvSpPr/>
+          <p:nvPr/>
+        </p:nvSpPr>
+        <p:spPr>
+          <a:xfrm>
+            <a:off x="10260460" y="3193554"/>
+            <a:ext cx="806240" cy="487674"/>
+          </a:xfrm>
+          <a:prstGeom prst="rect">
+            <a:avLst/>
+          </a:prstGeom>
+          <a:solidFill>
+            <a:srgbClr val="222222"/>
+          </a:solidFill>
+        </p:spPr>
+        <p:style>
+          <a:lnRef idx="2">
+            <a:schemeClr val="accent1">
+              <a:shade val="50000"/>
+            </a:schemeClr>
+          </a:lnRef>
+          <a:fillRef idx="1">
+            <a:schemeClr val="accent1"/>
+          </a:fillRef>
+          <a:effectRef idx="0">
+            <a:schemeClr val="accent1"/>
+          </a:effectRef>
+          <a:fontRef idx="minor">
+            <a:schemeClr val="lt1"/>
+          </a:fontRef>
+        </p:style>
+        <p:txBody>
+          <a:bodyPr rtlCol="0" anchor="ctr"/>
+          <a:lstStyle/>
+          <a:p>
+            <a:pPr algn="ctr"/>
+            <a:endParaRPr lang="en-FI"/>
+          </a:p>
+        </p:txBody>
+      </p:sp>
+      <p:sp>
+        <p:nvSpPr>
+          <p:cNvPr id="52" name="Freeform: Shape 51">
+            <a:extLst>
+              <a:ext uri="{FF2B5EF4-FFF2-40B4-BE49-F238E27FC236}">
+                <a16:creationId xmlns:a16="http://schemas.microsoft.com/office/drawing/2014/main" id="{ADB72738-FB2F-4AF4-839D-C72BCAE9654C}"/>
+              </a:ext>
+            </a:extLst>
+          </p:cNvPr>
+          <p:cNvSpPr/>
+          <p:nvPr/>
+        </p:nvSpPr>
+        <p:spPr>
+          <a:xfrm>
+            <a:off x="10251223" y="3367624"/>
+            <a:ext cx="814283" cy="314424"/>
+          </a:xfrm>
+          <a:custGeom>
+            <a:avLst/>
+            <a:gdLst>
+              <a:gd name="connsiteX0" fmla="*/ 0 w 814283"/>
+              <a:gd name="connsiteY0" fmla="*/ 114191 h 314424"/>
+              <a:gd name="connsiteX1" fmla="*/ 0 w 814283"/>
+              <a:gd name="connsiteY1" fmla="*/ 114191 h 314424"/>
+              <a:gd name="connsiteX2" fmla="*/ 100116 w 814283"/>
+              <a:gd name="connsiteY2" fmla="*/ 94167 h 314424"/>
+              <a:gd name="connsiteX3" fmla="*/ 120140 w 814283"/>
+              <a:gd name="connsiteY3" fmla="*/ 87493 h 314424"/>
+              <a:gd name="connsiteX4" fmla="*/ 146838 w 814283"/>
+              <a:gd name="connsiteY4" fmla="*/ 27423 h 314424"/>
+              <a:gd name="connsiteX5" fmla="*/ 186884 w 814283"/>
+              <a:gd name="connsiteY5" fmla="*/ 725 h 314424"/>
+              <a:gd name="connsiteX6" fmla="*/ 266978 w 814283"/>
+              <a:gd name="connsiteY6" fmla="*/ 27423 h 314424"/>
+              <a:gd name="connsiteX7" fmla="*/ 307024 w 814283"/>
+              <a:gd name="connsiteY7" fmla="*/ 40772 h 314424"/>
+              <a:gd name="connsiteX8" fmla="*/ 327048 w 814283"/>
+              <a:gd name="connsiteY8" fmla="*/ 54121 h 314424"/>
+              <a:gd name="connsiteX9" fmla="*/ 333722 w 814283"/>
+              <a:gd name="connsiteY9" fmla="*/ 80818 h 314424"/>
+              <a:gd name="connsiteX10" fmla="*/ 353746 w 814283"/>
+              <a:gd name="connsiteY10" fmla="*/ 87493 h 314424"/>
+              <a:gd name="connsiteX11" fmla="*/ 500584 w 814283"/>
+              <a:gd name="connsiteY11" fmla="*/ 80818 h 314424"/>
+              <a:gd name="connsiteX12" fmla="*/ 553979 w 814283"/>
+              <a:gd name="connsiteY12" fmla="*/ 74144 h 314424"/>
+              <a:gd name="connsiteX13" fmla="*/ 574003 w 814283"/>
+              <a:gd name="connsiteY13" fmla="*/ 54121 h 314424"/>
+              <a:gd name="connsiteX14" fmla="*/ 594026 w 814283"/>
+              <a:gd name="connsiteY14" fmla="*/ 47446 h 314424"/>
+              <a:gd name="connsiteX15" fmla="*/ 707492 w 814283"/>
+              <a:gd name="connsiteY15" fmla="*/ 60795 h 314424"/>
+              <a:gd name="connsiteX16" fmla="*/ 747538 w 814283"/>
+              <a:gd name="connsiteY16" fmla="*/ 74144 h 314424"/>
+              <a:gd name="connsiteX17" fmla="*/ 787585 w 814283"/>
+              <a:gd name="connsiteY17" fmla="*/ 100842 h 314424"/>
+              <a:gd name="connsiteX18" fmla="*/ 814283 w 814283"/>
+              <a:gd name="connsiteY18" fmla="*/ 100842 h 314424"/>
+              <a:gd name="connsiteX19" fmla="*/ 807608 w 814283"/>
+              <a:gd name="connsiteY19" fmla="*/ 314424 h 314424"/>
+              <a:gd name="connsiteX20" fmla="*/ 13349 w 814283"/>
+              <a:gd name="connsiteY20" fmla="*/ 307750 h 314424"/>
+              <a:gd name="connsiteX21" fmla="*/ 0 w 814283"/>
+              <a:gd name="connsiteY21" fmla="*/ 114191 h 314424"/>
+            </a:gdLst>
+            <a:ahLst/>
+            <a:cxnLst>
+              <a:cxn ang="0">
+                <a:pos x="connsiteX0" y="connsiteY0"/>
+              </a:cxn>
+              <a:cxn ang="0">
+                <a:pos x="connsiteX1" y="connsiteY1"/>
+              </a:cxn>
+              <a:cxn ang="0">
+                <a:pos x="connsiteX2" y="connsiteY2"/>
+              </a:cxn>
+              <a:cxn ang="0">
+                <a:pos x="connsiteX3" y="connsiteY3"/>
+              </a:cxn>
+              <a:cxn ang="0">
+                <a:pos x="connsiteX4" y="connsiteY4"/>
+              </a:cxn>
+              <a:cxn ang="0">
+                <a:pos x="connsiteX5" y="connsiteY5"/>
+              </a:cxn>
+              <a:cxn ang="0">
+                <a:pos x="connsiteX6" y="connsiteY6"/>
+              </a:cxn>
+              <a:cxn ang="0">
+                <a:pos x="connsiteX7" y="connsiteY7"/>
+              </a:cxn>
+              <a:cxn ang="0">
+                <a:pos x="connsiteX8" y="connsiteY8"/>
+              </a:cxn>
+              <a:cxn ang="0">
+                <a:pos x="connsiteX9" y="connsiteY9"/>
+              </a:cxn>
+              <a:cxn ang="0">
+                <a:pos x="connsiteX10" y="connsiteY10"/>
+              </a:cxn>
+              <a:cxn ang="0">
+                <a:pos x="connsiteX11" y="connsiteY11"/>
+              </a:cxn>
+              <a:cxn ang="0">
+                <a:pos x="connsiteX12" y="connsiteY12"/>
+              </a:cxn>
+              <a:cxn ang="0">
+                <a:pos x="connsiteX13" y="connsiteY13"/>
+              </a:cxn>
+              <a:cxn ang="0">
+                <a:pos x="connsiteX14" y="connsiteY14"/>
+              </a:cxn>
+              <a:cxn ang="0">
+                <a:pos x="connsiteX15" y="connsiteY15"/>
+              </a:cxn>
+              <a:cxn ang="0">
+                <a:pos x="connsiteX16" y="connsiteY16"/>
+              </a:cxn>
+              <a:cxn ang="0">
+                <a:pos x="connsiteX17" y="connsiteY17"/>
+              </a:cxn>
+              <a:cxn ang="0">
+                <a:pos x="connsiteX18" y="connsiteY18"/>
+              </a:cxn>
+              <a:cxn ang="0">
+                <a:pos x="connsiteX19" y="connsiteY19"/>
+              </a:cxn>
+              <a:cxn ang="0">
+                <a:pos x="connsiteX20" y="connsiteY20"/>
+              </a:cxn>
+              <a:cxn ang="0">
+                <a:pos x="connsiteX21" y="connsiteY21"/>
+              </a:cxn>
+            </a:cxnLst>
+            <a:rect l="l" t="t" r="r" b="b"/>
+            <a:pathLst>
+              <a:path w="814283" h="314424">
+                <a:moveTo>
+                  <a:pt x="0" y="114191"/>
+                </a:moveTo>
+                <a:lnTo>
+                  <a:pt x="0" y="114191"/>
+                </a:lnTo>
+                <a:cubicBezTo>
+                  <a:pt x="33372" y="107516"/>
+                  <a:pt x="66893" y="101550"/>
+                  <a:pt x="100116" y="94167"/>
+                </a:cubicBezTo>
+                <a:cubicBezTo>
+                  <a:pt x="106984" y="92641"/>
+                  <a:pt x="117283" y="93922"/>
+                  <a:pt x="120140" y="87493"/>
+                </a:cubicBezTo>
+                <a:cubicBezTo>
+                  <a:pt x="150329" y="19569"/>
+                  <a:pt x="100916" y="42729"/>
+                  <a:pt x="146838" y="27423"/>
+                </a:cubicBezTo>
+                <a:cubicBezTo>
+                  <a:pt x="160187" y="18524"/>
+                  <a:pt x="171664" y="-4348"/>
+                  <a:pt x="186884" y="725"/>
+                </a:cubicBezTo>
+                <a:lnTo>
+                  <a:pt x="266978" y="27423"/>
+                </a:lnTo>
+                <a:cubicBezTo>
+                  <a:pt x="266983" y="27425"/>
+                  <a:pt x="307020" y="40769"/>
+                  <a:pt x="307024" y="40772"/>
+                </a:cubicBezTo>
+                <a:lnTo>
+                  <a:pt x="327048" y="54121"/>
+                </a:lnTo>
+                <a:cubicBezTo>
+                  <a:pt x="329273" y="63020"/>
+                  <a:pt x="327992" y="73655"/>
+                  <a:pt x="333722" y="80818"/>
+                </a:cubicBezTo>
+                <a:cubicBezTo>
+                  <a:pt x="338117" y="86312"/>
+                  <a:pt x="346710" y="87493"/>
+                  <a:pt x="353746" y="87493"/>
+                </a:cubicBezTo>
+                <a:cubicBezTo>
+                  <a:pt x="402743" y="87493"/>
+                  <a:pt x="451638" y="83043"/>
+                  <a:pt x="500584" y="80818"/>
+                </a:cubicBezTo>
+                <a:cubicBezTo>
+                  <a:pt x="518382" y="78593"/>
+                  <a:pt x="537122" y="80274"/>
+                  <a:pt x="553979" y="74144"/>
+                </a:cubicBezTo>
+                <a:cubicBezTo>
+                  <a:pt x="562850" y="70918"/>
+                  <a:pt x="566149" y="59357"/>
+                  <a:pt x="574003" y="54121"/>
+                </a:cubicBezTo>
+                <a:cubicBezTo>
+                  <a:pt x="579857" y="50218"/>
+                  <a:pt x="587352" y="49671"/>
+                  <a:pt x="594026" y="47446"/>
+                </a:cubicBezTo>
+                <a:cubicBezTo>
+                  <a:pt x="631848" y="51896"/>
+                  <a:pt x="669972" y="54270"/>
+                  <a:pt x="707492" y="60795"/>
+                </a:cubicBezTo>
+                <a:cubicBezTo>
+                  <a:pt x="721355" y="63206"/>
+                  <a:pt x="735830" y="66339"/>
+                  <a:pt x="747538" y="74144"/>
+                </a:cubicBezTo>
+                <a:cubicBezTo>
+                  <a:pt x="760887" y="83043"/>
+                  <a:pt x="771541" y="100842"/>
+                  <a:pt x="787585" y="100842"/>
+                </a:cubicBezTo>
+                <a:lnTo>
+                  <a:pt x="814283" y="100842"/>
+                </a:lnTo>
+                <a:lnTo>
+                  <a:pt x="807608" y="314424"/>
+                </a:lnTo>
+                <a:lnTo>
+                  <a:pt x="13349" y="307750"/>
+                </a:lnTo>
+                <a:lnTo>
+                  <a:pt x="0" y="114191"/>
+                </a:lnTo>
+                <a:close/>
+              </a:path>
+            </a:pathLst>
+          </a:custGeom>
+          <a:solidFill>
+            <a:schemeClr val="bg1">
+              <a:lumMod val="65000"/>
+            </a:schemeClr>
+          </a:solidFill>
+        </p:spPr>
+        <p:style>
+          <a:lnRef idx="2">
+            <a:schemeClr val="accent1">
+              <a:shade val="50000"/>
+            </a:schemeClr>
+          </a:lnRef>
+          <a:fillRef idx="1">
+            <a:schemeClr val="accent1"/>
+          </a:fillRef>
+          <a:effectRef idx="0">
+            <a:schemeClr val="accent1"/>
+          </a:effectRef>
+          <a:fontRef idx="minor">
+            <a:schemeClr val="lt1"/>
+          </a:fontRef>
+        </p:style>
+        <p:txBody>
+          <a:bodyPr rtlCol="0" anchor="ctr"/>
+          <a:lstStyle/>
+          <a:p>
+            <a:pPr algn="ctr"/>
+            <a:endParaRPr lang="en-FI"/>
+          </a:p>
+        </p:txBody>
+      </p:sp>
+      <p:sp>
+        <p:nvSpPr>
+          <p:cNvPr id="53" name="TextBox 52">
+            <a:extLst>
+              <a:ext uri="{FF2B5EF4-FFF2-40B4-BE49-F238E27FC236}">
+                <a16:creationId xmlns:a16="http://schemas.microsoft.com/office/drawing/2014/main" id="{2CAD8112-5C65-4C23-AF23-EFED7E27CAF6}"/>
+              </a:ext>
+            </a:extLst>
+          </p:cNvPr>
+          <p:cNvSpPr txBox="1"/>
+          <p:nvPr/>
+        </p:nvSpPr>
+        <p:spPr>
+          <a:xfrm>
+            <a:off x="10334958" y="3031983"/>
+            <a:ext cx="635110" cy="169277"/>
+          </a:xfrm>
+          <a:prstGeom prst="rect">
+            <a:avLst/>
+          </a:prstGeom>
+          <a:noFill/>
+        </p:spPr>
+        <p:txBody>
+          <a:bodyPr wrap="none" rtlCol="0">
+            <a:spAutoFit/>
+          </a:bodyPr>
+          <a:lstStyle/>
+          <a:p>
+            <a:r>
+              <a:rPr lang="en-US" sz="500" dirty="0">
+                <a:solidFill>
+                  <a:schemeClr val="bg1"/>
+                </a:solidFill>
+              </a:rPr>
+              <a:t>Temperature (°C)</a:t>
+            </a:r>
+            <a:endParaRPr lang="en-FI" sz="500" dirty="0">
+              <a:solidFill>
+                <a:schemeClr val="bg1"/>
+              </a:solidFill>
+            </a:endParaRPr>
+          </a:p>
+        </p:txBody>
+      </p:sp>
+      <p:cxnSp>
+        <p:nvCxnSpPr>
+          <p:cNvPr id="54" name="Straight Arrow Connector 53">
+            <a:extLst>
+              <a:ext uri="{FF2B5EF4-FFF2-40B4-BE49-F238E27FC236}">
+                <a16:creationId xmlns:a16="http://schemas.microsoft.com/office/drawing/2014/main" id="{0677FF90-9C56-452E-8589-DB44C00D872F}"/>
+              </a:ext>
+            </a:extLst>
+          </p:cNvPr>
+          <p:cNvCxnSpPr>
+            <a:cxnSpLocks/>
+            <a:stCxn id="44" idx="1"/>
+            <a:endCxn id="27" idx="4"/>
+          </p:cNvCxnSpPr>
+          <p:nvPr/>
+        </p:nvCxnSpPr>
+        <p:spPr>
+          <a:xfrm flipH="1">
+            <a:off x="8301398" y="3658201"/>
+            <a:ext cx="1746844" cy="181036"/>
+          </a:xfrm>
+          <a:prstGeom prst="straightConnector1">
+            <a:avLst/>
+          </a:prstGeom>
+          <a:ln>
+            <a:tailEnd type="triangle"/>
+          </a:ln>
+        </p:spPr>
+        <p:style>
+          <a:lnRef idx="1">
+            <a:schemeClr val="accent1"/>
+          </a:lnRef>
+          <a:fillRef idx="0">
+            <a:schemeClr val="accent1"/>
+          </a:fillRef>
+          <a:effectRef idx="0">
+            <a:schemeClr val="accent1"/>
+          </a:effectRef>
+          <a:fontRef idx="minor">
+            <a:schemeClr val="tx1"/>
+          </a:fontRef>
+        </p:style>
+      </p:cxnSp>
+      <p:cxnSp>
+        <p:nvCxnSpPr>
+          <p:cNvPr id="58" name="Straight Arrow Connector 57">
+            <a:extLst>
+              <a:ext uri="{FF2B5EF4-FFF2-40B4-BE49-F238E27FC236}">
+                <a16:creationId xmlns:a16="http://schemas.microsoft.com/office/drawing/2014/main" id="{85C9C244-CBE6-4E7B-B5CF-85D7367C0CFD}"/>
+              </a:ext>
+            </a:extLst>
+          </p:cNvPr>
+          <p:cNvCxnSpPr>
+            <a:cxnSpLocks/>
+            <a:stCxn id="39" idx="3"/>
+            <a:endCxn id="45" idx="1"/>
+          </p:cNvCxnSpPr>
+          <p:nvPr/>
+        </p:nvCxnSpPr>
+        <p:spPr>
+          <a:xfrm>
+            <a:off x="8582183" y="2739815"/>
+            <a:ext cx="1563445" cy="910138"/>
           </a:xfrm>
           <a:prstGeom prst="straightConnector1">
             <a:avLst/>

</xml_diff>